<commit_message>
Implement code structure updates and remove redundant sections
</commit_message>
<xml_diff>
--- a/32x9-sample-output-presentation.pptx
+++ b/32x9-sample-output-presentation.pptx
@@ -5,21 +5,21 @@
     <p:sldMasterId id="2147483648" r:id="rId1"/>
   </p:sldMasterIdLst>
   <p:sldIdLst>
-    <p:sldId id="256" r:id="rId7"/>
-    <p:sldId id="257" r:id="rId8"/>
-    <p:sldId id="258" r:id="rId9"/>
-    <p:sldId id="259" r:id="rId10"/>
-    <p:sldId id="260" r:id="rId11"/>
-    <p:sldId id="261" r:id="rId12"/>
-    <p:sldId id="262" r:id="rId13"/>
-    <p:sldId id="263" r:id="rId14"/>
-    <p:sldId id="264" r:id="rId15"/>
-    <p:sldId id="265" r:id="rId16"/>
-    <p:sldId id="266" r:id="rId17"/>
-    <p:sldId id="267" r:id="rId18"/>
-    <p:sldId id="268" r:id="rId19"/>
+    <p:sldId id="256" r:id="rId2"/>
+    <p:sldId id="257" r:id="rId3"/>
+    <p:sldId id="258" r:id="rId4"/>
+    <p:sldId id="259" r:id="rId5"/>
+    <p:sldId id="260" r:id="rId6"/>
+    <p:sldId id="261" r:id="rId7"/>
+    <p:sldId id="262" r:id="rId8"/>
+    <p:sldId id="263" r:id="rId9"/>
+    <p:sldId id="264" r:id="rId10"/>
+    <p:sldId id="265" r:id="rId11"/>
+    <p:sldId id="266" r:id="rId12"/>
+    <p:sldId id="267" r:id="rId13"/>
+    <p:sldId id="268" r:id="rId14"/>
   </p:sldIdLst>
-  <p:sldSz cx="11520525" cy="3240084" type="screen4x3"/>
+  <p:sldSz cx="11520488" cy="3240088"/>
   <p:notesSz cx="6858000" cy="9144000"/>
   <p:defaultTextStyle>
     <a:defPPr>
@@ -116,6 +116,22 @@
       </a:defRPr>
     </a:lvl9pPr>
   </p:defaultTextStyle>
+  <p:extLst>
+    <p:ext uri="{EFAFB233-063F-42B5-8137-9DF3F51BA10A}">
+      <p15:sldGuideLst xmlns:p15="http://schemas.microsoft.com/office/powerpoint/2012/main">
+        <p15:guide id="1" orient="horz" pos="2160">
+          <p15:clr>
+            <a:srgbClr val="A4A3A4"/>
+          </p15:clr>
+        </p15:guide>
+        <p15:guide id="2" pos="2880">
+          <p15:clr>
+            <a:srgbClr val="A4A3A4"/>
+          </p15:clr>
+        </p15:guide>
+      </p15:sldGuideLst>
+    </p:ext>
+  </p:extLst>
 </p:presentation>
 </file>
 
@@ -157,10 +173,9 @@
           <a:lstStyle/>
           <a:p>
             <a:r>
-              <a:rPr lang="en-US" smtClean="0"/>
+              <a:rPr lang="en-US"/>
               <a:t>Click to edit Master title style</a:t>
             </a:r>
-            <a:endParaRPr lang="en-US"/>
           </a:p>
         </p:txBody>
       </p:sp>
@@ -276,10 +291,9 @@
           </a:lstStyle>
           <a:p>
             <a:r>
-              <a:rPr lang="en-US" smtClean="0"/>
+              <a:rPr lang="en-US"/>
               <a:t>Click to edit Master subtitle style</a:t>
             </a:r>
-            <a:endParaRPr lang="en-US"/>
           </a:p>
         </p:txBody>
       </p:sp>
@@ -300,7 +314,7 @@
           <a:p>
             <a:fld id="{5BCAD085-E8A6-8845-BD4E-CB4CCA059FC4}" type="datetimeFigureOut">
               <a:rPr lang="en-US" smtClean="0"/>
-              <a:t>1/27/13</a:t>
+              <a:t>11/5/2025</a:t>
             </a:fld>
             <a:endParaRPr lang="en-US"/>
           </a:p>
@@ -394,10 +408,9 @@
           <a:lstStyle/>
           <a:p>
             <a:r>
-              <a:rPr lang="en-US" smtClean="0"/>
+              <a:rPr lang="en-US"/>
               <a:t>Click to edit Master title style</a:t>
             </a:r>
-            <a:endParaRPr lang="en-US"/>
           </a:p>
         </p:txBody>
       </p:sp>
@@ -418,38 +431,37 @@
           <a:p>
             <a:pPr lvl="0"/>
             <a:r>
-              <a:rPr lang="en-US" smtClean="0"/>
+              <a:rPr lang="en-US"/>
               <a:t>Click to edit Master text styles</a:t>
             </a:r>
           </a:p>
           <a:p>
             <a:pPr lvl="1"/>
             <a:r>
-              <a:rPr lang="en-US" smtClean="0"/>
+              <a:rPr lang="en-US"/>
               <a:t>Second level</a:t>
             </a:r>
           </a:p>
           <a:p>
             <a:pPr lvl="2"/>
             <a:r>
-              <a:rPr lang="en-US" smtClean="0"/>
+              <a:rPr lang="en-US"/>
               <a:t>Third level</a:t>
             </a:r>
           </a:p>
           <a:p>
             <a:pPr lvl="3"/>
             <a:r>
-              <a:rPr lang="en-US" smtClean="0"/>
+              <a:rPr lang="en-US"/>
               <a:t>Fourth level</a:t>
             </a:r>
           </a:p>
           <a:p>
             <a:pPr lvl="4"/>
             <a:r>
-              <a:rPr lang="en-US" smtClean="0"/>
+              <a:rPr lang="en-US"/>
               <a:t>Fifth level</a:t>
             </a:r>
-            <a:endParaRPr lang="en-US"/>
           </a:p>
         </p:txBody>
       </p:sp>
@@ -470,7 +482,7 @@
           <a:p>
             <a:fld id="{5BCAD085-E8A6-8845-BD4E-CB4CCA059FC4}" type="datetimeFigureOut">
               <a:rPr lang="en-US" smtClean="0"/>
-              <a:t>1/27/13</a:t>
+              <a:t>11/5/2025</a:t>
             </a:fld>
             <a:endParaRPr lang="en-US"/>
           </a:p>
@@ -569,10 +581,9 @@
           <a:lstStyle/>
           <a:p>
             <a:r>
-              <a:rPr lang="en-US" smtClean="0"/>
+              <a:rPr lang="en-US"/>
               <a:t>Click to edit Master title style</a:t>
             </a:r>
-            <a:endParaRPr lang="en-US"/>
           </a:p>
         </p:txBody>
       </p:sp>
@@ -598,38 +609,37 @@
           <a:p>
             <a:pPr lvl="0"/>
             <a:r>
-              <a:rPr lang="en-US" smtClean="0"/>
+              <a:rPr lang="en-US"/>
               <a:t>Click to edit Master text styles</a:t>
             </a:r>
           </a:p>
           <a:p>
             <a:pPr lvl="1"/>
             <a:r>
-              <a:rPr lang="en-US" smtClean="0"/>
+              <a:rPr lang="en-US"/>
               <a:t>Second level</a:t>
             </a:r>
           </a:p>
           <a:p>
             <a:pPr lvl="2"/>
             <a:r>
-              <a:rPr lang="en-US" smtClean="0"/>
+              <a:rPr lang="en-US"/>
               <a:t>Third level</a:t>
             </a:r>
           </a:p>
           <a:p>
             <a:pPr lvl="3"/>
             <a:r>
-              <a:rPr lang="en-US" smtClean="0"/>
+              <a:rPr lang="en-US"/>
               <a:t>Fourth level</a:t>
             </a:r>
           </a:p>
           <a:p>
             <a:pPr lvl="4"/>
             <a:r>
-              <a:rPr lang="en-US" smtClean="0"/>
+              <a:rPr lang="en-US"/>
               <a:t>Fifth level</a:t>
             </a:r>
-            <a:endParaRPr lang="en-US"/>
           </a:p>
         </p:txBody>
       </p:sp>
@@ -650,7 +660,7 @@
           <a:p>
             <a:fld id="{5BCAD085-E8A6-8845-BD4E-CB4CCA059FC4}" type="datetimeFigureOut">
               <a:rPr lang="en-US" smtClean="0"/>
-              <a:t>1/27/13</a:t>
+              <a:t>11/5/2025</a:t>
             </a:fld>
             <a:endParaRPr lang="en-US"/>
           </a:p>
@@ -744,10 +754,9 @@
           <a:lstStyle/>
           <a:p>
             <a:r>
-              <a:rPr lang="en-US" smtClean="0"/>
+              <a:rPr lang="en-US"/>
               <a:t>Click to edit Master title style</a:t>
             </a:r>
-            <a:endParaRPr lang="en-US"/>
           </a:p>
         </p:txBody>
       </p:sp>
@@ -768,38 +777,37 @@
           <a:p>
             <a:pPr lvl="0"/>
             <a:r>
-              <a:rPr lang="en-US" smtClean="0"/>
+              <a:rPr lang="en-US"/>
               <a:t>Click to edit Master text styles</a:t>
             </a:r>
           </a:p>
           <a:p>
             <a:pPr lvl="1"/>
             <a:r>
-              <a:rPr lang="en-US" smtClean="0"/>
+              <a:rPr lang="en-US"/>
               <a:t>Second level</a:t>
             </a:r>
           </a:p>
           <a:p>
             <a:pPr lvl="2"/>
             <a:r>
-              <a:rPr lang="en-US" smtClean="0"/>
+              <a:rPr lang="en-US"/>
               <a:t>Third level</a:t>
             </a:r>
           </a:p>
           <a:p>
             <a:pPr lvl="3"/>
             <a:r>
-              <a:rPr lang="en-US" smtClean="0"/>
+              <a:rPr lang="en-US"/>
               <a:t>Fourth level</a:t>
             </a:r>
           </a:p>
           <a:p>
             <a:pPr lvl="4"/>
             <a:r>
-              <a:rPr lang="en-US" smtClean="0"/>
+              <a:rPr lang="en-US"/>
               <a:t>Fifth level</a:t>
             </a:r>
-            <a:endParaRPr lang="en-US"/>
           </a:p>
         </p:txBody>
       </p:sp>
@@ -820,7 +828,7 @@
           <a:p>
             <a:fld id="{5BCAD085-E8A6-8845-BD4E-CB4CCA059FC4}" type="datetimeFigureOut">
               <a:rPr lang="en-US" smtClean="0"/>
-              <a:t>1/27/13</a:t>
+              <a:t>11/5/2025</a:t>
             </a:fld>
             <a:endParaRPr lang="en-US"/>
           </a:p>
@@ -923,10 +931,9 @@
           </a:lstStyle>
           <a:p>
             <a:r>
-              <a:rPr lang="en-US" smtClean="0"/>
+              <a:rPr lang="en-US"/>
               <a:t>Click to edit Master title style</a:t>
             </a:r>
-            <a:endParaRPr lang="en-US"/>
           </a:p>
         </p:txBody>
       </p:sp>
@@ -1043,7 +1050,7 @@
           <a:p>
             <a:pPr lvl="0"/>
             <a:r>
-              <a:rPr lang="en-US" smtClean="0"/>
+              <a:rPr lang="en-US"/>
               <a:t>Click to edit Master text styles</a:t>
             </a:r>
           </a:p>
@@ -1066,7 +1073,7 @@
           <a:p>
             <a:fld id="{5BCAD085-E8A6-8845-BD4E-CB4CCA059FC4}" type="datetimeFigureOut">
               <a:rPr lang="en-US" smtClean="0"/>
-              <a:t>1/27/13</a:t>
+              <a:t>11/5/2025</a:t>
             </a:fld>
             <a:endParaRPr lang="en-US"/>
           </a:p>
@@ -1160,10 +1167,9 @@
           <a:lstStyle/>
           <a:p>
             <a:r>
-              <a:rPr lang="en-US" smtClean="0"/>
+              <a:rPr lang="en-US"/>
               <a:t>Click to edit Master title style</a:t>
             </a:r>
-            <a:endParaRPr lang="en-US"/>
           </a:p>
         </p:txBody>
       </p:sp>
@@ -1217,38 +1223,37 @@
           <a:p>
             <a:pPr lvl="0"/>
             <a:r>
-              <a:rPr lang="en-US" smtClean="0"/>
+              <a:rPr lang="en-US"/>
               <a:t>Click to edit Master text styles</a:t>
             </a:r>
           </a:p>
           <a:p>
             <a:pPr lvl="1"/>
             <a:r>
-              <a:rPr lang="en-US" smtClean="0"/>
+              <a:rPr lang="en-US"/>
               <a:t>Second level</a:t>
             </a:r>
           </a:p>
           <a:p>
             <a:pPr lvl="2"/>
             <a:r>
-              <a:rPr lang="en-US" smtClean="0"/>
+              <a:rPr lang="en-US"/>
               <a:t>Third level</a:t>
             </a:r>
           </a:p>
           <a:p>
             <a:pPr lvl="3"/>
             <a:r>
-              <a:rPr lang="en-US" smtClean="0"/>
+              <a:rPr lang="en-US"/>
               <a:t>Fourth level</a:t>
             </a:r>
           </a:p>
           <a:p>
             <a:pPr lvl="4"/>
             <a:r>
-              <a:rPr lang="en-US" smtClean="0"/>
+              <a:rPr lang="en-US"/>
               <a:t>Fifth level</a:t>
             </a:r>
-            <a:endParaRPr lang="en-US"/>
           </a:p>
         </p:txBody>
       </p:sp>
@@ -1302,38 +1307,37 @@
           <a:p>
             <a:pPr lvl="0"/>
             <a:r>
-              <a:rPr lang="en-US" smtClean="0"/>
+              <a:rPr lang="en-US"/>
               <a:t>Click to edit Master text styles</a:t>
             </a:r>
           </a:p>
           <a:p>
             <a:pPr lvl="1"/>
             <a:r>
-              <a:rPr lang="en-US" smtClean="0"/>
+              <a:rPr lang="en-US"/>
               <a:t>Second level</a:t>
             </a:r>
           </a:p>
           <a:p>
             <a:pPr lvl="2"/>
             <a:r>
-              <a:rPr lang="en-US" smtClean="0"/>
+              <a:rPr lang="en-US"/>
               <a:t>Third level</a:t>
             </a:r>
           </a:p>
           <a:p>
             <a:pPr lvl="3"/>
             <a:r>
-              <a:rPr lang="en-US" smtClean="0"/>
+              <a:rPr lang="en-US"/>
               <a:t>Fourth level</a:t>
             </a:r>
           </a:p>
           <a:p>
             <a:pPr lvl="4"/>
             <a:r>
-              <a:rPr lang="en-US" smtClean="0"/>
+              <a:rPr lang="en-US"/>
               <a:t>Fifth level</a:t>
             </a:r>
-            <a:endParaRPr lang="en-US"/>
           </a:p>
         </p:txBody>
       </p:sp>
@@ -1354,7 +1358,7 @@
           <a:p>
             <a:fld id="{5BCAD085-E8A6-8845-BD4E-CB4CCA059FC4}" type="datetimeFigureOut">
               <a:rPr lang="en-US" smtClean="0"/>
-              <a:t>1/27/13</a:t>
+              <a:t>11/5/2025</a:t>
             </a:fld>
             <a:endParaRPr lang="en-US"/>
           </a:p>
@@ -1452,10 +1456,9 @@
           </a:lstStyle>
           <a:p>
             <a:r>
-              <a:rPr lang="en-US" smtClean="0"/>
+              <a:rPr lang="en-US"/>
               <a:t>Click to edit Master title style</a:t>
             </a:r>
-            <a:endParaRPr lang="en-US"/>
           </a:p>
         </p:txBody>
       </p:sp>
@@ -1518,7 +1521,7 @@
           <a:p>
             <a:pPr lvl="0"/>
             <a:r>
-              <a:rPr lang="en-US" smtClean="0"/>
+              <a:rPr lang="en-US"/>
               <a:t>Click to edit Master text styles</a:t>
             </a:r>
           </a:p>
@@ -1574,38 +1577,37 @@
           <a:p>
             <a:pPr lvl="0"/>
             <a:r>
-              <a:rPr lang="en-US" smtClean="0"/>
+              <a:rPr lang="en-US"/>
               <a:t>Click to edit Master text styles</a:t>
             </a:r>
           </a:p>
           <a:p>
             <a:pPr lvl="1"/>
             <a:r>
-              <a:rPr lang="en-US" smtClean="0"/>
+              <a:rPr lang="en-US"/>
               <a:t>Second level</a:t>
             </a:r>
           </a:p>
           <a:p>
             <a:pPr lvl="2"/>
             <a:r>
-              <a:rPr lang="en-US" smtClean="0"/>
+              <a:rPr lang="en-US"/>
               <a:t>Third level</a:t>
             </a:r>
           </a:p>
           <a:p>
             <a:pPr lvl="3"/>
             <a:r>
-              <a:rPr lang="en-US" smtClean="0"/>
+              <a:rPr lang="en-US"/>
               <a:t>Fourth level</a:t>
             </a:r>
           </a:p>
           <a:p>
             <a:pPr lvl="4"/>
             <a:r>
-              <a:rPr lang="en-US" smtClean="0"/>
+              <a:rPr lang="en-US"/>
               <a:t>Fifth level</a:t>
             </a:r>
-            <a:endParaRPr lang="en-US"/>
           </a:p>
         </p:txBody>
       </p:sp>
@@ -1668,7 +1670,7 @@
           <a:p>
             <a:pPr lvl="0"/>
             <a:r>
-              <a:rPr lang="en-US" smtClean="0"/>
+              <a:rPr lang="en-US"/>
               <a:t>Click to edit Master text styles</a:t>
             </a:r>
           </a:p>
@@ -1724,38 +1726,37 @@
           <a:p>
             <a:pPr lvl="0"/>
             <a:r>
-              <a:rPr lang="en-US" smtClean="0"/>
+              <a:rPr lang="en-US"/>
               <a:t>Click to edit Master text styles</a:t>
             </a:r>
           </a:p>
           <a:p>
             <a:pPr lvl="1"/>
             <a:r>
-              <a:rPr lang="en-US" smtClean="0"/>
+              <a:rPr lang="en-US"/>
               <a:t>Second level</a:t>
             </a:r>
           </a:p>
           <a:p>
             <a:pPr lvl="2"/>
             <a:r>
-              <a:rPr lang="en-US" smtClean="0"/>
+              <a:rPr lang="en-US"/>
               <a:t>Third level</a:t>
             </a:r>
           </a:p>
           <a:p>
             <a:pPr lvl="3"/>
             <a:r>
-              <a:rPr lang="en-US" smtClean="0"/>
+              <a:rPr lang="en-US"/>
               <a:t>Fourth level</a:t>
             </a:r>
           </a:p>
           <a:p>
             <a:pPr lvl="4"/>
             <a:r>
-              <a:rPr lang="en-US" smtClean="0"/>
+              <a:rPr lang="en-US"/>
               <a:t>Fifth level</a:t>
             </a:r>
-            <a:endParaRPr lang="en-US"/>
           </a:p>
         </p:txBody>
       </p:sp>
@@ -1776,7 +1777,7 @@
           <a:p>
             <a:fld id="{5BCAD085-E8A6-8845-BD4E-CB4CCA059FC4}" type="datetimeFigureOut">
               <a:rPr lang="en-US" smtClean="0"/>
-              <a:t>1/27/13</a:t>
+              <a:t>11/5/2025</a:t>
             </a:fld>
             <a:endParaRPr lang="en-US"/>
           </a:p>
@@ -1870,10 +1871,9 @@
           <a:lstStyle/>
           <a:p>
             <a:r>
-              <a:rPr lang="en-US" smtClean="0"/>
+              <a:rPr lang="en-US"/>
               <a:t>Click to edit Master title style</a:t>
             </a:r>
-            <a:endParaRPr lang="en-US"/>
           </a:p>
         </p:txBody>
       </p:sp>
@@ -1894,7 +1894,7 @@
           <a:p>
             <a:fld id="{5BCAD085-E8A6-8845-BD4E-CB4CCA059FC4}" type="datetimeFigureOut">
               <a:rPr lang="en-US" smtClean="0"/>
-              <a:t>1/27/13</a:t>
+              <a:t>11/5/2025</a:t>
             </a:fld>
             <a:endParaRPr lang="en-US"/>
           </a:p>
@@ -1989,7 +1989,7 @@
           <a:p>
             <a:fld id="{5BCAD085-E8A6-8845-BD4E-CB4CCA059FC4}" type="datetimeFigureOut">
               <a:rPr lang="en-US" smtClean="0"/>
-              <a:t>1/27/13</a:t>
+              <a:t>11/5/2025</a:t>
             </a:fld>
             <a:endParaRPr lang="en-US"/>
           </a:p>
@@ -2092,10 +2092,9 @@
           </a:lstStyle>
           <a:p>
             <a:r>
-              <a:rPr lang="en-US" smtClean="0"/>
+              <a:rPr lang="en-US"/>
               <a:t>Click to edit Master title style</a:t>
             </a:r>
-            <a:endParaRPr lang="en-US"/>
           </a:p>
         </p:txBody>
       </p:sp>
@@ -2149,38 +2148,37 @@
           <a:p>
             <a:pPr lvl="0"/>
             <a:r>
-              <a:rPr lang="en-US" smtClean="0"/>
+              <a:rPr lang="en-US"/>
               <a:t>Click to edit Master text styles</a:t>
             </a:r>
           </a:p>
           <a:p>
             <a:pPr lvl="1"/>
             <a:r>
-              <a:rPr lang="en-US" smtClean="0"/>
+              <a:rPr lang="en-US"/>
               <a:t>Second level</a:t>
             </a:r>
           </a:p>
           <a:p>
             <a:pPr lvl="2"/>
             <a:r>
-              <a:rPr lang="en-US" smtClean="0"/>
+              <a:rPr lang="en-US"/>
               <a:t>Third level</a:t>
             </a:r>
           </a:p>
           <a:p>
             <a:pPr lvl="3"/>
             <a:r>
-              <a:rPr lang="en-US" smtClean="0"/>
+              <a:rPr lang="en-US"/>
               <a:t>Fourth level</a:t>
             </a:r>
           </a:p>
           <a:p>
             <a:pPr lvl="4"/>
             <a:r>
-              <a:rPr lang="en-US" smtClean="0"/>
+              <a:rPr lang="en-US"/>
               <a:t>Fifth level</a:t>
             </a:r>
-            <a:endParaRPr lang="en-US"/>
           </a:p>
         </p:txBody>
       </p:sp>
@@ -2243,7 +2241,7 @@
           <a:p>
             <a:pPr lvl="0"/>
             <a:r>
-              <a:rPr lang="en-US" smtClean="0"/>
+              <a:rPr lang="en-US"/>
               <a:t>Click to edit Master text styles</a:t>
             </a:r>
           </a:p>
@@ -2266,7 +2264,7 @@
           <a:p>
             <a:fld id="{5BCAD085-E8A6-8845-BD4E-CB4CCA059FC4}" type="datetimeFigureOut">
               <a:rPr lang="en-US" smtClean="0"/>
-              <a:t>1/27/13</a:t>
+              <a:t>11/5/2025</a:t>
             </a:fld>
             <a:endParaRPr lang="en-US"/>
           </a:p>
@@ -2369,10 +2367,9 @@
           </a:lstStyle>
           <a:p>
             <a:r>
-              <a:rPr lang="en-US" smtClean="0"/>
+              <a:rPr lang="en-US"/>
               <a:t>Click to edit Master title style</a:t>
             </a:r>
-            <a:endParaRPr lang="en-US"/>
           </a:p>
         </p:txBody>
       </p:sp>
@@ -2496,7 +2493,7 @@
           <a:p>
             <a:pPr lvl="0"/>
             <a:r>
-              <a:rPr lang="en-US" smtClean="0"/>
+              <a:rPr lang="en-US"/>
               <a:t>Click to edit Master text styles</a:t>
             </a:r>
           </a:p>
@@ -2519,7 +2516,7 @@
           <a:p>
             <a:fld id="{5BCAD085-E8A6-8845-BD4E-CB4CCA059FC4}" type="datetimeFigureOut">
               <a:rPr lang="en-US" smtClean="0"/>
-              <a:t>1/27/13</a:t>
+              <a:t>11/5/2025</a:t>
             </a:fld>
             <a:endParaRPr lang="en-US"/>
           </a:p>
@@ -2628,10 +2625,9 @@
           <a:lstStyle/>
           <a:p>
             <a:r>
-              <a:rPr lang="en-US" smtClean="0"/>
+              <a:rPr lang="en-US"/>
               <a:t>Click to edit Master title style</a:t>
             </a:r>
-            <a:endParaRPr lang="en-US"/>
           </a:p>
         </p:txBody>
       </p:sp>
@@ -2662,38 +2658,37 @@
           <a:p>
             <a:pPr lvl="0"/>
             <a:r>
-              <a:rPr lang="en-US" smtClean="0"/>
+              <a:rPr lang="en-US"/>
               <a:t>Click to edit Master text styles</a:t>
             </a:r>
           </a:p>
           <a:p>
             <a:pPr lvl="1"/>
             <a:r>
-              <a:rPr lang="en-US" smtClean="0"/>
+              <a:rPr lang="en-US"/>
               <a:t>Second level</a:t>
             </a:r>
           </a:p>
           <a:p>
             <a:pPr lvl="2"/>
             <a:r>
-              <a:rPr lang="en-US" smtClean="0"/>
+              <a:rPr lang="en-US"/>
               <a:t>Third level</a:t>
             </a:r>
           </a:p>
           <a:p>
             <a:pPr lvl="3"/>
             <a:r>
-              <a:rPr lang="en-US" smtClean="0"/>
+              <a:rPr lang="en-US"/>
               <a:t>Fourth level</a:t>
             </a:r>
           </a:p>
           <a:p>
             <a:pPr lvl="4"/>
             <a:r>
-              <a:rPr lang="en-US" smtClean="0"/>
+              <a:rPr lang="en-US"/>
               <a:t>Fifth level</a:t>
             </a:r>
-            <a:endParaRPr lang="en-US"/>
           </a:p>
         </p:txBody>
       </p:sp>
@@ -2732,7 +2727,7 @@
           <a:p>
             <a:fld id="{5BCAD085-E8A6-8845-BD4E-CB4CCA059FC4}" type="datetimeFigureOut">
               <a:rPr lang="en-US" smtClean="0"/>
-              <a:t>1/27/13</a:t>
+              <a:t>11/5/2025</a:t>
             </a:fld>
             <a:endParaRPr lang="en-US"/>
           </a:p>
@@ -3091,7 +3086,7 @@
 </file>
 
 <file path=ppt/slides/slide1.xml><?xml version="1.0" encoding="utf-8"?>
-<p:sld xmlns:a="http://schemas.openxmlformats.org/drawingml/2006/main" xmlns:p="http://schemas.openxmlformats.org/presentationml/2006/main" xmlns:r="http://schemas.openxmlformats.org/officeDocument/2006/relationships">
+<p:sld xmlns:a="http://schemas.openxmlformats.org/drawingml/2006/main" xmlns:r="http://schemas.openxmlformats.org/officeDocument/2006/relationships" xmlns:p="http://schemas.openxmlformats.org/presentationml/2006/main">
   <p:cSld>
     <p:bg>
       <p:bgPr>
@@ -3107,7 +3102,14 @@
         <p:cNvGrpSpPr/>
         <p:nvPr/>
       </p:nvGrpSpPr>
-      <p:grpSpPr/>
+      <p:grpSpPr>
+        <a:xfrm>
+          <a:off x="0" y="0"/>
+          <a:ext cx="0" cy="0"/>
+          <a:chOff x="0" y="0"/>
+          <a:chExt cx="0" cy="0"/>
+        </a:xfrm>
+      </p:grpSpPr>
       <p:pic>
         <p:nvPicPr>
           <p:cNvPr id="2" name="Picture 1" descr="slide_001.png"/>
@@ -3220,7 +3222,7 @@
                 </a:srgbClr>
               </a:gs>
             </a:gsLst>
-            <a:lin scaled="0" ang="0"/>
+            <a:lin ang="0" scaled="0"/>
           </a:gradFill>
           <a:ln>
             <a:noFill/>
@@ -3245,6 +3247,7 @@
           <a:lstStyle/>
           <a:p>
             <a:pPr algn="ctr"/>
+            <a:endParaRPr/>
           </a:p>
         </p:txBody>
       </p:sp>
@@ -3273,7 +3276,7 @@
                 <a:srgbClr val="000000"/>
               </a:gs>
             </a:gsLst>
-            <a:lin scaled="0" ang="10800000"/>
+            <a:lin ang="10800000" scaled="0"/>
           </a:gradFill>
           <a:ln>
             <a:noFill/>
@@ -3298,6 +3301,7 @@
           <a:lstStyle/>
           <a:p>
             <a:pPr algn="ctr"/>
+            <a:endParaRPr/>
           </a:p>
         </p:txBody>
       </p:sp>
@@ -3306,11 +3310,23 @@
   <p:clrMapOvr>
     <a:masterClrMapping/>
   </p:clrMapOvr>
+  <mc:AlternateContent xmlns:mc="http://schemas.openxmlformats.org/markup-compatibility/2006">
+    <mc:Choice xmlns:p159="http://schemas.microsoft.com/office/powerpoint/2015/09/main" Requires="p159">
+      <p:transition xmlns:p14="http://schemas.microsoft.com/office/powerpoint/2010/main" spd="slow" p14:dur="2000">
+        <p159:morph option="byObject"/>
+      </p:transition>
+    </mc:Choice>
+    <mc:Fallback>
+      <p:transition spd="slow">
+        <p:fade/>
+      </p:transition>
+    </mc:Fallback>
+  </mc:AlternateContent>
 </p:sld>
 </file>
 
 <file path=ppt/slides/slide10.xml><?xml version="1.0" encoding="utf-8"?>
-<p:sld xmlns:a="http://schemas.openxmlformats.org/drawingml/2006/main" xmlns:p="http://schemas.openxmlformats.org/presentationml/2006/main" xmlns:r="http://schemas.openxmlformats.org/officeDocument/2006/relationships">
+<p:sld xmlns:a="http://schemas.openxmlformats.org/drawingml/2006/main" xmlns:r="http://schemas.openxmlformats.org/officeDocument/2006/relationships" xmlns:p="http://schemas.openxmlformats.org/presentationml/2006/main">
   <p:cSld>
     <p:bg>
       <p:bgPr>
@@ -3326,7 +3342,14 @@
         <p:cNvGrpSpPr/>
         <p:nvPr/>
       </p:nvGrpSpPr>
-      <p:grpSpPr/>
+      <p:grpSpPr>
+        <a:xfrm>
+          <a:off x="0" y="0"/>
+          <a:ext cx="0" cy="0"/>
+          <a:chOff x="0" y="0"/>
+          <a:chExt cx="0" cy="0"/>
+        </a:xfrm>
+      </p:grpSpPr>
       <p:pic>
         <p:nvPicPr>
           <p:cNvPr id="2" name="Picture 1" descr="slide_008.png"/>
@@ -3497,7 +3520,7 @@
                 </a:srgbClr>
               </a:gs>
             </a:gsLst>
-            <a:lin scaled="0" ang="0"/>
+            <a:lin ang="0" scaled="0"/>
           </a:gradFill>
           <a:ln>
             <a:noFill/>
@@ -3522,6 +3545,7 @@
           <a:lstStyle/>
           <a:p>
             <a:pPr algn="ctr"/>
+            <a:endParaRPr/>
           </a:p>
         </p:txBody>
       </p:sp>
@@ -3550,7 +3574,7 @@
                 <a:srgbClr val="000000"/>
               </a:gs>
             </a:gsLst>
-            <a:lin scaled="0" ang="10800000"/>
+            <a:lin ang="10800000" scaled="0"/>
           </a:gradFill>
           <a:ln>
             <a:noFill/>
@@ -3575,6 +3599,7 @@
           <a:lstStyle/>
           <a:p>
             <a:pPr algn="ctr"/>
+            <a:endParaRPr/>
           </a:p>
         </p:txBody>
       </p:sp>
@@ -3583,11 +3608,23 @@
   <p:clrMapOvr>
     <a:masterClrMapping/>
   </p:clrMapOvr>
+  <mc:AlternateContent xmlns:mc="http://schemas.openxmlformats.org/markup-compatibility/2006">
+    <mc:Choice xmlns:p159="http://schemas.microsoft.com/office/powerpoint/2015/09/main" Requires="p159">
+      <p:transition xmlns:p14="http://schemas.microsoft.com/office/powerpoint/2010/main" spd="slow" p14:dur="2000">
+        <p159:morph option="byObject"/>
+      </p:transition>
+    </mc:Choice>
+    <mc:Fallback>
+      <p:transition spd="slow">
+        <p:fade/>
+      </p:transition>
+    </mc:Fallback>
+  </mc:AlternateContent>
 </p:sld>
 </file>
 
 <file path=ppt/slides/slide11.xml><?xml version="1.0" encoding="utf-8"?>
-<p:sld xmlns:a="http://schemas.openxmlformats.org/drawingml/2006/main" xmlns:p="http://schemas.openxmlformats.org/presentationml/2006/main" xmlns:r="http://schemas.openxmlformats.org/officeDocument/2006/relationships">
+<p:sld xmlns:a="http://schemas.openxmlformats.org/drawingml/2006/main" xmlns:r="http://schemas.openxmlformats.org/officeDocument/2006/relationships" xmlns:p="http://schemas.openxmlformats.org/presentationml/2006/main">
   <p:cSld>
     <p:bg>
       <p:bgPr>
@@ -3603,7 +3640,14 @@
         <p:cNvGrpSpPr/>
         <p:nvPr/>
       </p:nvGrpSpPr>
-      <p:grpSpPr/>
+      <p:grpSpPr>
+        <a:xfrm>
+          <a:off x="0" y="0"/>
+          <a:ext cx="0" cy="0"/>
+          <a:chOff x="0" y="0"/>
+          <a:chExt cx="0" cy="0"/>
+        </a:xfrm>
+      </p:grpSpPr>
       <p:pic>
         <p:nvPicPr>
           <p:cNvPr id="2" name="Picture 1" descr="slide_009.png"/>
@@ -3774,7 +3818,7 @@
                 </a:srgbClr>
               </a:gs>
             </a:gsLst>
-            <a:lin scaled="0" ang="0"/>
+            <a:lin ang="0" scaled="0"/>
           </a:gradFill>
           <a:ln>
             <a:noFill/>
@@ -3799,6 +3843,7 @@
           <a:lstStyle/>
           <a:p>
             <a:pPr algn="ctr"/>
+            <a:endParaRPr/>
           </a:p>
         </p:txBody>
       </p:sp>
@@ -3827,7 +3872,7 @@
                 <a:srgbClr val="000000"/>
               </a:gs>
             </a:gsLst>
-            <a:lin scaled="0" ang="10800000"/>
+            <a:lin ang="10800000" scaled="0"/>
           </a:gradFill>
           <a:ln>
             <a:noFill/>
@@ -3852,6 +3897,7 @@
           <a:lstStyle/>
           <a:p>
             <a:pPr algn="ctr"/>
+            <a:endParaRPr/>
           </a:p>
         </p:txBody>
       </p:sp>
@@ -3860,11 +3906,23 @@
   <p:clrMapOvr>
     <a:masterClrMapping/>
   </p:clrMapOvr>
+  <mc:AlternateContent xmlns:mc="http://schemas.openxmlformats.org/markup-compatibility/2006">
+    <mc:Choice xmlns:p159="http://schemas.microsoft.com/office/powerpoint/2015/09/main" Requires="p159">
+      <p:transition xmlns:p14="http://schemas.microsoft.com/office/powerpoint/2010/main" spd="slow" p14:dur="2000">
+        <p159:morph option="byObject"/>
+      </p:transition>
+    </mc:Choice>
+    <mc:Fallback>
+      <p:transition spd="slow">
+        <p:fade/>
+      </p:transition>
+    </mc:Fallback>
+  </mc:AlternateContent>
 </p:sld>
 </file>
 
 <file path=ppt/slides/slide12.xml><?xml version="1.0" encoding="utf-8"?>
-<p:sld xmlns:a="http://schemas.openxmlformats.org/drawingml/2006/main" xmlns:p="http://schemas.openxmlformats.org/presentationml/2006/main" xmlns:r="http://schemas.openxmlformats.org/officeDocument/2006/relationships">
+<p:sld xmlns:a="http://schemas.openxmlformats.org/drawingml/2006/main" xmlns:r="http://schemas.openxmlformats.org/officeDocument/2006/relationships" xmlns:p="http://schemas.openxmlformats.org/presentationml/2006/main">
   <p:cSld>
     <p:bg>
       <p:bgPr>
@@ -3880,7 +3938,14 @@
         <p:cNvGrpSpPr/>
         <p:nvPr/>
       </p:nvGrpSpPr>
-      <p:grpSpPr/>
+      <p:grpSpPr>
+        <a:xfrm>
+          <a:off x="0" y="0"/>
+          <a:ext cx="0" cy="0"/>
+          <a:chOff x="0" y="0"/>
+          <a:chExt cx="0" cy="0"/>
+        </a:xfrm>
+      </p:grpSpPr>
       <p:pic>
         <p:nvPicPr>
           <p:cNvPr id="2" name="Picture 1" descr="slide_010.png"/>
@@ -4022,7 +4087,7 @@
                 </a:srgbClr>
               </a:gs>
             </a:gsLst>
-            <a:lin scaled="0" ang="0"/>
+            <a:lin ang="0" scaled="0"/>
           </a:gradFill>
           <a:ln>
             <a:noFill/>
@@ -4047,6 +4112,7 @@
           <a:lstStyle/>
           <a:p>
             <a:pPr algn="ctr"/>
+            <a:endParaRPr/>
           </a:p>
         </p:txBody>
       </p:sp>
@@ -4075,7 +4141,7 @@
                 <a:srgbClr val="000000"/>
               </a:gs>
             </a:gsLst>
-            <a:lin scaled="0" ang="10800000"/>
+            <a:lin ang="10800000" scaled="0"/>
           </a:gradFill>
           <a:ln>
             <a:noFill/>
@@ -4100,6 +4166,7 @@
           <a:lstStyle/>
           <a:p>
             <a:pPr algn="ctr"/>
+            <a:endParaRPr/>
           </a:p>
         </p:txBody>
       </p:sp>
@@ -4108,11 +4175,23 @@
   <p:clrMapOvr>
     <a:masterClrMapping/>
   </p:clrMapOvr>
+  <mc:AlternateContent xmlns:mc="http://schemas.openxmlformats.org/markup-compatibility/2006">
+    <mc:Choice xmlns:p159="http://schemas.microsoft.com/office/powerpoint/2015/09/main" Requires="p159">
+      <p:transition xmlns:p14="http://schemas.microsoft.com/office/powerpoint/2010/main" spd="slow" p14:dur="2000">
+        <p159:morph option="byObject"/>
+      </p:transition>
+    </mc:Choice>
+    <mc:Fallback>
+      <p:transition spd="slow">
+        <p:fade/>
+      </p:transition>
+    </mc:Fallback>
+  </mc:AlternateContent>
 </p:sld>
 </file>
 
 <file path=ppt/slides/slide13.xml><?xml version="1.0" encoding="utf-8"?>
-<p:sld xmlns:a="http://schemas.openxmlformats.org/drawingml/2006/main" xmlns:p="http://schemas.openxmlformats.org/presentationml/2006/main" xmlns:r="http://schemas.openxmlformats.org/officeDocument/2006/relationships">
+<p:sld xmlns:a="http://schemas.openxmlformats.org/drawingml/2006/main" xmlns:r="http://schemas.openxmlformats.org/officeDocument/2006/relationships" xmlns:p="http://schemas.openxmlformats.org/presentationml/2006/main">
   <p:cSld>
     <p:bg>
       <p:bgPr>
@@ -4128,7 +4207,14 @@
         <p:cNvGrpSpPr/>
         <p:nvPr/>
       </p:nvGrpSpPr>
-      <p:grpSpPr/>
+      <p:grpSpPr>
+        <a:xfrm>
+          <a:off x="0" y="0"/>
+          <a:ext cx="0" cy="0"/>
+          <a:chOff x="0" y="0"/>
+          <a:chExt cx="0" cy="0"/>
+        </a:xfrm>
+      </p:grpSpPr>
       <p:pic>
         <p:nvPicPr>
           <p:cNvPr id="2" name="Picture 1" descr="slide_011.png"/>
@@ -4241,7 +4327,7 @@
                 </a:srgbClr>
               </a:gs>
             </a:gsLst>
-            <a:lin scaled="0" ang="0"/>
+            <a:lin ang="0" scaled="0"/>
           </a:gradFill>
           <a:ln>
             <a:noFill/>
@@ -4266,6 +4352,7 @@
           <a:lstStyle/>
           <a:p>
             <a:pPr algn="ctr"/>
+            <a:endParaRPr/>
           </a:p>
         </p:txBody>
       </p:sp>
@@ -4294,7 +4381,7 @@
                 <a:srgbClr val="000000"/>
               </a:gs>
             </a:gsLst>
-            <a:lin scaled="0" ang="10800000"/>
+            <a:lin ang="10800000" scaled="0"/>
           </a:gradFill>
           <a:ln>
             <a:noFill/>
@@ -4319,6 +4406,7 @@
           <a:lstStyle/>
           <a:p>
             <a:pPr algn="ctr"/>
+            <a:endParaRPr/>
           </a:p>
         </p:txBody>
       </p:sp>
@@ -4327,11 +4415,23 @@
   <p:clrMapOvr>
     <a:masterClrMapping/>
   </p:clrMapOvr>
+  <mc:AlternateContent xmlns:mc="http://schemas.openxmlformats.org/markup-compatibility/2006">
+    <mc:Choice xmlns:p159="http://schemas.microsoft.com/office/powerpoint/2015/09/main" Requires="p159">
+      <p:transition xmlns:p14="http://schemas.microsoft.com/office/powerpoint/2010/main" spd="slow" p14:dur="2000">
+        <p159:morph option="byObject"/>
+      </p:transition>
+    </mc:Choice>
+    <mc:Fallback>
+      <p:transition spd="slow">
+        <p:fade/>
+      </p:transition>
+    </mc:Fallback>
+  </mc:AlternateContent>
 </p:sld>
 </file>
 
 <file path=ppt/slides/slide2.xml><?xml version="1.0" encoding="utf-8"?>
-<p:sld xmlns:a="http://schemas.openxmlformats.org/drawingml/2006/main" xmlns:p="http://schemas.openxmlformats.org/presentationml/2006/main" xmlns:r="http://schemas.openxmlformats.org/officeDocument/2006/relationships">
+<p:sld xmlns:a="http://schemas.openxmlformats.org/drawingml/2006/main" xmlns:r="http://schemas.openxmlformats.org/officeDocument/2006/relationships" xmlns:p="http://schemas.openxmlformats.org/presentationml/2006/main">
   <p:cSld>
     <p:bg>
       <p:bgPr>
@@ -4347,7 +4447,14 @@
         <p:cNvGrpSpPr/>
         <p:nvPr/>
       </p:nvGrpSpPr>
-      <p:grpSpPr/>
+      <p:grpSpPr>
+        <a:xfrm>
+          <a:off x="0" y="0"/>
+          <a:ext cx="0" cy="0"/>
+          <a:chOff x="0" y="0"/>
+          <a:chExt cx="0" cy="0"/>
+        </a:xfrm>
+      </p:grpSpPr>
       <p:pic>
         <p:nvPicPr>
           <p:cNvPr id="2" name="Picture 1" descr="slide_001.png"/>
@@ -4489,7 +4596,7 @@
                 </a:srgbClr>
               </a:gs>
             </a:gsLst>
-            <a:lin scaled="0" ang="0"/>
+            <a:lin ang="0" scaled="0"/>
           </a:gradFill>
           <a:ln>
             <a:noFill/>
@@ -4514,6 +4621,7 @@
           <a:lstStyle/>
           <a:p>
             <a:pPr algn="ctr"/>
+            <a:endParaRPr/>
           </a:p>
         </p:txBody>
       </p:sp>
@@ -4542,7 +4650,7 @@
                 <a:srgbClr val="000000"/>
               </a:gs>
             </a:gsLst>
-            <a:lin scaled="0" ang="10800000"/>
+            <a:lin ang="10800000" scaled="0"/>
           </a:gradFill>
           <a:ln>
             <a:noFill/>
@@ -4567,6 +4675,7 @@
           <a:lstStyle/>
           <a:p>
             <a:pPr algn="ctr"/>
+            <a:endParaRPr/>
           </a:p>
         </p:txBody>
       </p:sp>
@@ -4575,11 +4684,23 @@
   <p:clrMapOvr>
     <a:masterClrMapping/>
   </p:clrMapOvr>
+  <mc:AlternateContent xmlns:mc="http://schemas.openxmlformats.org/markup-compatibility/2006">
+    <mc:Choice xmlns:p159="http://schemas.microsoft.com/office/powerpoint/2015/09/main" Requires="p159">
+      <p:transition xmlns:p14="http://schemas.microsoft.com/office/powerpoint/2010/main" spd="slow" p14:dur="2000">
+        <p159:morph option="byObject"/>
+      </p:transition>
+    </mc:Choice>
+    <mc:Fallback>
+      <p:transition spd="slow">
+        <p:fade/>
+      </p:transition>
+    </mc:Fallback>
+  </mc:AlternateContent>
 </p:sld>
 </file>
 
 <file path=ppt/slides/slide3.xml><?xml version="1.0" encoding="utf-8"?>
-<p:sld xmlns:a="http://schemas.openxmlformats.org/drawingml/2006/main" xmlns:p="http://schemas.openxmlformats.org/presentationml/2006/main" xmlns:r="http://schemas.openxmlformats.org/officeDocument/2006/relationships">
+<p:sld xmlns:a="http://schemas.openxmlformats.org/drawingml/2006/main" xmlns:r="http://schemas.openxmlformats.org/officeDocument/2006/relationships" xmlns:p="http://schemas.openxmlformats.org/presentationml/2006/main">
   <p:cSld>
     <p:bg>
       <p:bgPr>
@@ -4595,7 +4716,14 @@
         <p:cNvGrpSpPr/>
         <p:nvPr/>
       </p:nvGrpSpPr>
-      <p:grpSpPr/>
+      <p:grpSpPr>
+        <a:xfrm>
+          <a:off x="0" y="0"/>
+          <a:ext cx="0" cy="0"/>
+          <a:chOff x="0" y="0"/>
+          <a:chExt cx="0" cy="0"/>
+        </a:xfrm>
+      </p:grpSpPr>
       <p:pic>
         <p:nvPicPr>
           <p:cNvPr id="2" name="Picture 1" descr="slide_001.png"/>
@@ -4766,7 +4894,7 @@
                 </a:srgbClr>
               </a:gs>
             </a:gsLst>
-            <a:lin scaled="0" ang="0"/>
+            <a:lin ang="0" scaled="0"/>
           </a:gradFill>
           <a:ln>
             <a:noFill/>
@@ -4791,6 +4919,7 @@
           <a:lstStyle/>
           <a:p>
             <a:pPr algn="ctr"/>
+            <a:endParaRPr/>
           </a:p>
         </p:txBody>
       </p:sp>
@@ -4819,7 +4948,7 @@
                 <a:srgbClr val="000000"/>
               </a:gs>
             </a:gsLst>
-            <a:lin scaled="0" ang="10800000"/>
+            <a:lin ang="10800000" scaled="0"/>
           </a:gradFill>
           <a:ln>
             <a:noFill/>
@@ -4844,6 +4973,7 @@
           <a:lstStyle/>
           <a:p>
             <a:pPr algn="ctr"/>
+            <a:endParaRPr/>
           </a:p>
         </p:txBody>
       </p:sp>
@@ -4852,11 +4982,23 @@
   <p:clrMapOvr>
     <a:masterClrMapping/>
   </p:clrMapOvr>
+  <mc:AlternateContent xmlns:mc="http://schemas.openxmlformats.org/markup-compatibility/2006">
+    <mc:Choice xmlns:p159="http://schemas.microsoft.com/office/powerpoint/2015/09/main" Requires="p159">
+      <p:transition xmlns:p14="http://schemas.microsoft.com/office/powerpoint/2010/main" spd="slow" p14:dur="2000">
+        <p159:morph option="byObject"/>
+      </p:transition>
+    </mc:Choice>
+    <mc:Fallback>
+      <p:transition spd="slow">
+        <p:fade/>
+      </p:transition>
+    </mc:Fallback>
+  </mc:AlternateContent>
 </p:sld>
 </file>
 
 <file path=ppt/slides/slide4.xml><?xml version="1.0" encoding="utf-8"?>
-<p:sld xmlns:a="http://schemas.openxmlformats.org/drawingml/2006/main" xmlns:p="http://schemas.openxmlformats.org/presentationml/2006/main" xmlns:r="http://schemas.openxmlformats.org/officeDocument/2006/relationships">
+<p:sld xmlns:a="http://schemas.openxmlformats.org/drawingml/2006/main" xmlns:r="http://schemas.openxmlformats.org/officeDocument/2006/relationships" xmlns:p="http://schemas.openxmlformats.org/presentationml/2006/main">
   <p:cSld>
     <p:bg>
       <p:bgPr>
@@ -4872,7 +5014,14 @@
         <p:cNvGrpSpPr/>
         <p:nvPr/>
       </p:nvGrpSpPr>
-      <p:grpSpPr/>
+      <p:grpSpPr>
+        <a:xfrm>
+          <a:off x="0" y="0"/>
+          <a:ext cx="0" cy="0"/>
+          <a:chOff x="0" y="0"/>
+          <a:chExt cx="0" cy="0"/>
+        </a:xfrm>
+      </p:grpSpPr>
       <p:pic>
         <p:nvPicPr>
           <p:cNvPr id="2" name="Picture 1" descr="slide_002.png"/>
@@ -5043,7 +5192,7 @@
                 </a:srgbClr>
               </a:gs>
             </a:gsLst>
-            <a:lin scaled="0" ang="0"/>
+            <a:lin ang="0" scaled="0"/>
           </a:gradFill>
           <a:ln>
             <a:noFill/>
@@ -5068,6 +5217,7 @@
           <a:lstStyle/>
           <a:p>
             <a:pPr algn="ctr"/>
+            <a:endParaRPr/>
           </a:p>
         </p:txBody>
       </p:sp>
@@ -5096,7 +5246,7 @@
                 <a:srgbClr val="000000"/>
               </a:gs>
             </a:gsLst>
-            <a:lin scaled="0" ang="10800000"/>
+            <a:lin ang="10800000" scaled="0"/>
           </a:gradFill>
           <a:ln>
             <a:noFill/>
@@ -5121,6 +5271,7 @@
           <a:lstStyle/>
           <a:p>
             <a:pPr algn="ctr"/>
+            <a:endParaRPr/>
           </a:p>
         </p:txBody>
       </p:sp>
@@ -5129,11 +5280,23 @@
   <p:clrMapOvr>
     <a:masterClrMapping/>
   </p:clrMapOvr>
+  <mc:AlternateContent xmlns:mc="http://schemas.openxmlformats.org/markup-compatibility/2006">
+    <mc:Choice xmlns:p159="http://schemas.microsoft.com/office/powerpoint/2015/09/main" Requires="p159">
+      <p:transition xmlns:p14="http://schemas.microsoft.com/office/powerpoint/2010/main" spd="slow" p14:dur="2000">
+        <p159:morph option="byObject"/>
+      </p:transition>
+    </mc:Choice>
+    <mc:Fallback>
+      <p:transition spd="slow">
+        <p:fade/>
+      </p:transition>
+    </mc:Fallback>
+  </mc:AlternateContent>
 </p:sld>
 </file>
 
 <file path=ppt/slides/slide5.xml><?xml version="1.0" encoding="utf-8"?>
-<p:sld xmlns:a="http://schemas.openxmlformats.org/drawingml/2006/main" xmlns:p="http://schemas.openxmlformats.org/presentationml/2006/main" xmlns:r="http://schemas.openxmlformats.org/officeDocument/2006/relationships">
+<p:sld xmlns:a="http://schemas.openxmlformats.org/drawingml/2006/main" xmlns:r="http://schemas.openxmlformats.org/officeDocument/2006/relationships" xmlns:p="http://schemas.openxmlformats.org/presentationml/2006/main">
   <p:cSld>
     <p:bg>
       <p:bgPr>
@@ -5149,7 +5312,14 @@
         <p:cNvGrpSpPr/>
         <p:nvPr/>
       </p:nvGrpSpPr>
-      <p:grpSpPr/>
+      <p:grpSpPr>
+        <a:xfrm>
+          <a:off x="0" y="0"/>
+          <a:ext cx="0" cy="0"/>
+          <a:chOff x="0" y="0"/>
+          <a:chExt cx="0" cy="0"/>
+        </a:xfrm>
+      </p:grpSpPr>
       <p:pic>
         <p:nvPicPr>
           <p:cNvPr id="2" name="Picture 1" descr="slide_003.png"/>
@@ -5320,7 +5490,7 @@
                 </a:srgbClr>
               </a:gs>
             </a:gsLst>
-            <a:lin scaled="0" ang="0"/>
+            <a:lin ang="0" scaled="0"/>
           </a:gradFill>
           <a:ln>
             <a:noFill/>
@@ -5345,6 +5515,7 @@
           <a:lstStyle/>
           <a:p>
             <a:pPr algn="ctr"/>
+            <a:endParaRPr/>
           </a:p>
         </p:txBody>
       </p:sp>
@@ -5373,7 +5544,7 @@
                 <a:srgbClr val="000000"/>
               </a:gs>
             </a:gsLst>
-            <a:lin scaled="0" ang="10800000"/>
+            <a:lin ang="10800000" scaled="0"/>
           </a:gradFill>
           <a:ln>
             <a:noFill/>
@@ -5398,6 +5569,7 @@
           <a:lstStyle/>
           <a:p>
             <a:pPr algn="ctr"/>
+            <a:endParaRPr/>
           </a:p>
         </p:txBody>
       </p:sp>
@@ -5406,11 +5578,23 @@
   <p:clrMapOvr>
     <a:masterClrMapping/>
   </p:clrMapOvr>
+  <mc:AlternateContent xmlns:mc="http://schemas.openxmlformats.org/markup-compatibility/2006">
+    <mc:Choice xmlns:p159="http://schemas.microsoft.com/office/powerpoint/2015/09/main" Requires="p159">
+      <p:transition xmlns:p14="http://schemas.microsoft.com/office/powerpoint/2010/main" spd="slow" p14:dur="2000">
+        <p159:morph option="byObject"/>
+      </p:transition>
+    </mc:Choice>
+    <mc:Fallback>
+      <p:transition spd="slow">
+        <p:fade/>
+      </p:transition>
+    </mc:Fallback>
+  </mc:AlternateContent>
 </p:sld>
 </file>
 
 <file path=ppt/slides/slide6.xml><?xml version="1.0" encoding="utf-8"?>
-<p:sld xmlns:a="http://schemas.openxmlformats.org/drawingml/2006/main" xmlns:p="http://schemas.openxmlformats.org/presentationml/2006/main" xmlns:r="http://schemas.openxmlformats.org/officeDocument/2006/relationships">
+<p:sld xmlns:a="http://schemas.openxmlformats.org/drawingml/2006/main" xmlns:r="http://schemas.openxmlformats.org/officeDocument/2006/relationships" xmlns:p="http://schemas.openxmlformats.org/presentationml/2006/main">
   <p:cSld>
     <p:bg>
       <p:bgPr>
@@ -5426,7 +5610,14 @@
         <p:cNvGrpSpPr/>
         <p:nvPr/>
       </p:nvGrpSpPr>
-      <p:grpSpPr/>
+      <p:grpSpPr>
+        <a:xfrm>
+          <a:off x="0" y="0"/>
+          <a:ext cx="0" cy="0"/>
+          <a:chOff x="0" y="0"/>
+          <a:chExt cx="0" cy="0"/>
+        </a:xfrm>
+      </p:grpSpPr>
       <p:pic>
         <p:nvPicPr>
           <p:cNvPr id="2" name="Picture 1" descr="slide_004.png"/>
@@ -5597,7 +5788,7 @@
                 </a:srgbClr>
               </a:gs>
             </a:gsLst>
-            <a:lin scaled="0" ang="0"/>
+            <a:lin ang="0" scaled="0"/>
           </a:gradFill>
           <a:ln>
             <a:noFill/>
@@ -5622,6 +5813,7 @@
           <a:lstStyle/>
           <a:p>
             <a:pPr algn="ctr"/>
+            <a:endParaRPr/>
           </a:p>
         </p:txBody>
       </p:sp>
@@ -5650,7 +5842,7 @@
                 <a:srgbClr val="000000"/>
               </a:gs>
             </a:gsLst>
-            <a:lin scaled="0" ang="10800000"/>
+            <a:lin ang="10800000" scaled="0"/>
           </a:gradFill>
           <a:ln>
             <a:noFill/>
@@ -5675,6 +5867,7 @@
           <a:lstStyle/>
           <a:p>
             <a:pPr algn="ctr"/>
+            <a:endParaRPr/>
           </a:p>
         </p:txBody>
       </p:sp>
@@ -5683,11 +5876,23 @@
   <p:clrMapOvr>
     <a:masterClrMapping/>
   </p:clrMapOvr>
+  <mc:AlternateContent xmlns:mc="http://schemas.openxmlformats.org/markup-compatibility/2006">
+    <mc:Choice xmlns:p159="http://schemas.microsoft.com/office/powerpoint/2015/09/main" Requires="p159">
+      <p:transition xmlns:p14="http://schemas.microsoft.com/office/powerpoint/2010/main" spd="slow" p14:dur="2000">
+        <p159:morph option="byObject"/>
+      </p:transition>
+    </mc:Choice>
+    <mc:Fallback>
+      <p:transition spd="slow">
+        <p:fade/>
+      </p:transition>
+    </mc:Fallback>
+  </mc:AlternateContent>
 </p:sld>
 </file>
 
 <file path=ppt/slides/slide7.xml><?xml version="1.0" encoding="utf-8"?>
-<p:sld xmlns:a="http://schemas.openxmlformats.org/drawingml/2006/main" xmlns:p="http://schemas.openxmlformats.org/presentationml/2006/main" xmlns:r="http://schemas.openxmlformats.org/officeDocument/2006/relationships">
+<p:sld xmlns:a="http://schemas.openxmlformats.org/drawingml/2006/main" xmlns:r="http://schemas.openxmlformats.org/officeDocument/2006/relationships" xmlns:p="http://schemas.openxmlformats.org/presentationml/2006/main">
   <p:cSld>
     <p:bg>
       <p:bgPr>
@@ -5703,7 +5908,14 @@
         <p:cNvGrpSpPr/>
         <p:nvPr/>
       </p:nvGrpSpPr>
-      <p:grpSpPr/>
+      <p:grpSpPr>
+        <a:xfrm>
+          <a:off x="0" y="0"/>
+          <a:ext cx="0" cy="0"/>
+          <a:chOff x="0" y="0"/>
+          <a:chExt cx="0" cy="0"/>
+        </a:xfrm>
+      </p:grpSpPr>
       <p:pic>
         <p:nvPicPr>
           <p:cNvPr id="2" name="Picture 1" descr="slide_005.png"/>
@@ -5874,7 +6086,7 @@
                 </a:srgbClr>
               </a:gs>
             </a:gsLst>
-            <a:lin scaled="0" ang="0"/>
+            <a:lin ang="0" scaled="0"/>
           </a:gradFill>
           <a:ln>
             <a:noFill/>
@@ -5899,6 +6111,7 @@
           <a:lstStyle/>
           <a:p>
             <a:pPr algn="ctr"/>
+            <a:endParaRPr/>
           </a:p>
         </p:txBody>
       </p:sp>
@@ -5927,7 +6140,7 @@
                 <a:srgbClr val="000000"/>
               </a:gs>
             </a:gsLst>
-            <a:lin scaled="0" ang="10800000"/>
+            <a:lin ang="10800000" scaled="0"/>
           </a:gradFill>
           <a:ln>
             <a:noFill/>
@@ -5952,6 +6165,7 @@
           <a:lstStyle/>
           <a:p>
             <a:pPr algn="ctr"/>
+            <a:endParaRPr/>
           </a:p>
         </p:txBody>
       </p:sp>
@@ -5960,11 +6174,23 @@
   <p:clrMapOvr>
     <a:masterClrMapping/>
   </p:clrMapOvr>
+  <mc:AlternateContent xmlns:mc="http://schemas.openxmlformats.org/markup-compatibility/2006">
+    <mc:Choice xmlns:p159="http://schemas.microsoft.com/office/powerpoint/2015/09/main" Requires="p159">
+      <p:transition xmlns:p14="http://schemas.microsoft.com/office/powerpoint/2010/main" spd="slow" p14:dur="2000">
+        <p159:morph option="byObject"/>
+      </p:transition>
+    </mc:Choice>
+    <mc:Fallback>
+      <p:transition spd="slow">
+        <p:fade/>
+      </p:transition>
+    </mc:Fallback>
+  </mc:AlternateContent>
 </p:sld>
 </file>
 
 <file path=ppt/slides/slide8.xml><?xml version="1.0" encoding="utf-8"?>
-<p:sld xmlns:a="http://schemas.openxmlformats.org/drawingml/2006/main" xmlns:p="http://schemas.openxmlformats.org/presentationml/2006/main" xmlns:r="http://schemas.openxmlformats.org/officeDocument/2006/relationships">
+<p:sld xmlns:a="http://schemas.openxmlformats.org/drawingml/2006/main" xmlns:r="http://schemas.openxmlformats.org/officeDocument/2006/relationships" xmlns:p="http://schemas.openxmlformats.org/presentationml/2006/main">
   <p:cSld>
     <p:bg>
       <p:bgPr>
@@ -5980,7 +6206,14 @@
         <p:cNvGrpSpPr/>
         <p:nvPr/>
       </p:nvGrpSpPr>
-      <p:grpSpPr/>
+      <p:grpSpPr>
+        <a:xfrm>
+          <a:off x="0" y="0"/>
+          <a:ext cx="0" cy="0"/>
+          <a:chOff x="0" y="0"/>
+          <a:chExt cx="0" cy="0"/>
+        </a:xfrm>
+      </p:grpSpPr>
       <p:pic>
         <p:nvPicPr>
           <p:cNvPr id="2" name="Picture 1" descr="slide_006.png"/>
@@ -6151,7 +6384,7 @@
                 </a:srgbClr>
               </a:gs>
             </a:gsLst>
-            <a:lin scaled="0" ang="0"/>
+            <a:lin ang="0" scaled="0"/>
           </a:gradFill>
           <a:ln>
             <a:noFill/>
@@ -6176,6 +6409,7 @@
           <a:lstStyle/>
           <a:p>
             <a:pPr algn="ctr"/>
+            <a:endParaRPr/>
           </a:p>
         </p:txBody>
       </p:sp>
@@ -6204,7 +6438,7 @@
                 <a:srgbClr val="000000"/>
               </a:gs>
             </a:gsLst>
-            <a:lin scaled="0" ang="10800000"/>
+            <a:lin ang="10800000" scaled="0"/>
           </a:gradFill>
           <a:ln>
             <a:noFill/>
@@ -6229,6 +6463,7 @@
           <a:lstStyle/>
           <a:p>
             <a:pPr algn="ctr"/>
+            <a:endParaRPr/>
           </a:p>
         </p:txBody>
       </p:sp>
@@ -6237,11 +6472,23 @@
   <p:clrMapOvr>
     <a:masterClrMapping/>
   </p:clrMapOvr>
+  <mc:AlternateContent xmlns:mc="http://schemas.openxmlformats.org/markup-compatibility/2006">
+    <mc:Choice xmlns:p159="http://schemas.microsoft.com/office/powerpoint/2015/09/main" Requires="p159">
+      <p:transition xmlns:p14="http://schemas.microsoft.com/office/powerpoint/2010/main" spd="slow" p14:dur="2000">
+        <p159:morph option="byObject"/>
+      </p:transition>
+    </mc:Choice>
+    <mc:Fallback>
+      <p:transition spd="slow">
+        <p:fade/>
+      </p:transition>
+    </mc:Fallback>
+  </mc:AlternateContent>
 </p:sld>
 </file>
 
 <file path=ppt/slides/slide9.xml><?xml version="1.0" encoding="utf-8"?>
-<p:sld xmlns:a="http://schemas.openxmlformats.org/drawingml/2006/main" xmlns:p="http://schemas.openxmlformats.org/presentationml/2006/main" xmlns:r="http://schemas.openxmlformats.org/officeDocument/2006/relationships">
+<p:sld xmlns:a="http://schemas.openxmlformats.org/drawingml/2006/main" xmlns:r="http://schemas.openxmlformats.org/officeDocument/2006/relationships" xmlns:p="http://schemas.openxmlformats.org/presentationml/2006/main">
   <p:cSld>
     <p:bg>
       <p:bgPr>
@@ -6257,7 +6504,14 @@
         <p:cNvGrpSpPr/>
         <p:nvPr/>
       </p:nvGrpSpPr>
-      <p:grpSpPr/>
+      <p:grpSpPr>
+        <a:xfrm>
+          <a:off x="0" y="0"/>
+          <a:ext cx="0" cy="0"/>
+          <a:chOff x="0" y="0"/>
+          <a:chExt cx="0" cy="0"/>
+        </a:xfrm>
+      </p:grpSpPr>
       <p:pic>
         <p:nvPicPr>
           <p:cNvPr id="2" name="Picture 1" descr="slide_007.png"/>
@@ -6428,7 +6682,7 @@
                 </a:srgbClr>
               </a:gs>
             </a:gsLst>
-            <a:lin scaled="0" ang="0"/>
+            <a:lin ang="0" scaled="0"/>
           </a:gradFill>
           <a:ln>
             <a:noFill/>
@@ -6453,6 +6707,7 @@
           <a:lstStyle/>
           <a:p>
             <a:pPr algn="ctr"/>
+            <a:endParaRPr/>
           </a:p>
         </p:txBody>
       </p:sp>
@@ -6481,7 +6736,7 @@
                 <a:srgbClr val="000000"/>
               </a:gs>
             </a:gsLst>
-            <a:lin scaled="0" ang="10800000"/>
+            <a:lin ang="10800000" scaled="0"/>
           </a:gradFill>
           <a:ln>
             <a:noFill/>
@@ -6506,6 +6761,7 @@
           <a:lstStyle/>
           <a:p>
             <a:pPr algn="ctr"/>
+            <a:endParaRPr/>
           </a:p>
         </p:txBody>
       </p:sp>
@@ -6514,6 +6770,18 @@
   <p:clrMapOvr>
     <a:masterClrMapping/>
   </p:clrMapOvr>
+  <mc:AlternateContent xmlns:mc="http://schemas.openxmlformats.org/markup-compatibility/2006">
+    <mc:Choice xmlns:p159="http://schemas.microsoft.com/office/powerpoint/2015/09/main" Requires="p159">
+      <p:transition xmlns:p14="http://schemas.microsoft.com/office/powerpoint/2010/main" spd="slow" p14:dur="2000">
+        <p159:morph option="byObject"/>
+      </p:transition>
+    </mc:Choice>
+    <mc:Fallback>
+      <p:transition spd="slow">
+        <p:fade/>
+      </p:transition>
+    </mc:Fallback>
+  </mc:AlternateContent>
 </p:sld>
 </file>
 
@@ -6835,4 +7103,10 @@
   </a:objectDefaults>
   <a:extraClrSchemeLst/>
 </a:theme>
+</file>
+
+<file path=docMetadata/LabelInfo.xml><?xml version="1.0" encoding="utf-8"?>
+<clbl:labelList xmlns:clbl="http://schemas.microsoft.com/office/2020/mipLabelMetadata">
+  <clbl:label id="{f42aa342-8706-4288-bd11-ebb85995028c}" enabled="1" method="Standard" siteId="{72f988bf-86f1-41af-91ab-2d7cd011db47}" contentBits="0" removed="0"/>
+</clbl:labelList>
 </file>
</xml_diff>